<commit_message>
supporter tree loads (no style yet)
</commit_message>
<xml_diff>
--- a/com.supeyou.core.impl/src/main/java/com/supeyou/core/impl/initialdata/doc-files/testdata.pptx
+++ b/com.supeyou.core.impl/src/main/java/com/supeyou/core/impl/initialdata/doc-files/testdata.pptx
@@ -288,7 +288,7 @@
           <a:p>
             <a:fld id="{F28D2876-4E35-424B-B58D-3FCB4B19A780}" type="datetimeFigureOut">
               <a:rPr lang="en-US" smtClean="0"/>
-              <a:t>5/28/2015</a:t>
+              <a:t>6/26/2015</a:t>
             </a:fld>
             <a:endParaRPr lang="en-US"/>
           </a:p>
@@ -458,7 +458,7 @@
           <a:p>
             <a:fld id="{F28D2876-4E35-424B-B58D-3FCB4B19A780}" type="datetimeFigureOut">
               <a:rPr lang="en-US" smtClean="0"/>
-              <a:t>5/28/2015</a:t>
+              <a:t>6/26/2015</a:t>
             </a:fld>
             <a:endParaRPr lang="en-US"/>
           </a:p>
@@ -638,7 +638,7 @@
           <a:p>
             <a:fld id="{F28D2876-4E35-424B-B58D-3FCB4B19A780}" type="datetimeFigureOut">
               <a:rPr lang="en-US" smtClean="0"/>
-              <a:t>5/28/2015</a:t>
+              <a:t>6/26/2015</a:t>
             </a:fld>
             <a:endParaRPr lang="en-US"/>
           </a:p>
@@ -808,7 +808,7 @@
           <a:p>
             <a:fld id="{F28D2876-4E35-424B-B58D-3FCB4B19A780}" type="datetimeFigureOut">
               <a:rPr lang="en-US" smtClean="0"/>
-              <a:t>5/28/2015</a:t>
+              <a:t>6/26/2015</a:t>
             </a:fld>
             <a:endParaRPr lang="en-US"/>
           </a:p>
@@ -1054,7 +1054,7 @@
           <a:p>
             <a:fld id="{F28D2876-4E35-424B-B58D-3FCB4B19A780}" type="datetimeFigureOut">
               <a:rPr lang="en-US" smtClean="0"/>
-              <a:t>5/28/2015</a:t>
+              <a:t>6/26/2015</a:t>
             </a:fld>
             <a:endParaRPr lang="en-US"/>
           </a:p>
@@ -1342,7 +1342,7 @@
           <a:p>
             <a:fld id="{F28D2876-4E35-424B-B58D-3FCB4B19A780}" type="datetimeFigureOut">
               <a:rPr lang="en-US" smtClean="0"/>
-              <a:t>5/28/2015</a:t>
+              <a:t>6/26/2015</a:t>
             </a:fld>
             <a:endParaRPr lang="en-US"/>
           </a:p>
@@ -1764,7 +1764,7 @@
           <a:p>
             <a:fld id="{F28D2876-4E35-424B-B58D-3FCB4B19A780}" type="datetimeFigureOut">
               <a:rPr lang="en-US" smtClean="0"/>
-              <a:t>5/28/2015</a:t>
+              <a:t>6/26/2015</a:t>
             </a:fld>
             <a:endParaRPr lang="en-US"/>
           </a:p>
@@ -1882,7 +1882,7 @@
           <a:p>
             <a:fld id="{F28D2876-4E35-424B-B58D-3FCB4B19A780}" type="datetimeFigureOut">
               <a:rPr lang="en-US" smtClean="0"/>
-              <a:t>5/28/2015</a:t>
+              <a:t>6/26/2015</a:t>
             </a:fld>
             <a:endParaRPr lang="en-US"/>
           </a:p>
@@ -1977,7 +1977,7 @@
           <a:p>
             <a:fld id="{F28D2876-4E35-424B-B58D-3FCB4B19A780}" type="datetimeFigureOut">
               <a:rPr lang="en-US" smtClean="0"/>
-              <a:t>5/28/2015</a:t>
+              <a:t>6/26/2015</a:t>
             </a:fld>
             <a:endParaRPr lang="en-US"/>
           </a:p>
@@ -2254,7 +2254,7 @@
           <a:p>
             <a:fld id="{F28D2876-4E35-424B-B58D-3FCB4B19A780}" type="datetimeFigureOut">
               <a:rPr lang="en-US" smtClean="0"/>
-              <a:t>5/28/2015</a:t>
+              <a:t>6/26/2015</a:t>
             </a:fld>
             <a:endParaRPr lang="en-US"/>
           </a:p>
@@ -2507,7 +2507,7 @@
           <a:p>
             <a:fld id="{F28D2876-4E35-424B-B58D-3FCB4B19A780}" type="datetimeFigureOut">
               <a:rPr lang="en-US" smtClean="0"/>
-              <a:t>5/28/2015</a:t>
+              <a:t>6/26/2015</a:t>
             </a:fld>
             <a:endParaRPr lang="en-US"/>
           </a:p>
@@ -2720,7 +2720,7 @@
           <a:p>
             <a:fld id="{F28D2876-4E35-424B-B58D-3FCB4B19A780}" type="datetimeFigureOut">
               <a:rPr lang="en-US" smtClean="0"/>
-              <a:t>5/28/2015</a:t>
+              <a:t>6/26/2015</a:t>
             </a:fld>
             <a:endParaRPr lang="en-US"/>
           </a:p>
@@ -3189,7 +3189,7 @@
         </p:nvGrpSpPr>
         <p:grpSpPr>
           <a:xfrm>
-            <a:off x="2889914" y="1772816"/>
+            <a:off x="2395217" y="1772816"/>
             <a:ext cx="753475" cy="246221"/>
             <a:chOff x="2653308" y="1412776"/>
             <a:chExt cx="753475" cy="246221"/>
@@ -3364,8 +3364,8 @@
         </p:nvCxnSpPr>
         <p:spPr>
           <a:xfrm rot="5400000">
-            <a:off x="3075304" y="1322636"/>
-            <a:ext cx="387900" cy="568180"/>
+            <a:off x="2732895" y="1170349"/>
+            <a:ext cx="387900" cy="872755"/>
           </a:xfrm>
           <a:prstGeom prst="curvedConnector3">
             <a:avLst/>
@@ -3397,8 +3397,8 @@
         </p:nvCxnSpPr>
         <p:spPr>
           <a:xfrm rot="16200000" flipH="1">
-            <a:off x="3543356" y="1422764"/>
-            <a:ext cx="387900" cy="367924"/>
+            <a:off x="3448295" y="1327703"/>
+            <a:ext cx="387900" cy="558046"/>
           </a:xfrm>
           <a:prstGeom prst="curvedConnector3">
             <a:avLst>
@@ -3429,7 +3429,7 @@
         </p:nvGrpSpPr>
         <p:grpSpPr>
           <a:xfrm>
-            <a:off x="4943021" y="1782340"/>
+            <a:off x="5470154" y="1782340"/>
             <a:ext cx="614014" cy="246221"/>
             <a:chOff x="2653308" y="1412776"/>
             <a:chExt cx="614014" cy="246221"/>
@@ -3518,8 +3518,8 @@
         </p:nvCxnSpPr>
         <p:spPr>
           <a:xfrm rot="16200000" flipH="1">
-            <a:off x="4150865" y="706982"/>
-            <a:ext cx="213688" cy="477819"/>
+            <a:off x="4414432" y="443416"/>
+            <a:ext cx="213688" cy="1004952"/>
           </a:xfrm>
           <a:prstGeom prst="curvedConnector3">
             <a:avLst>
@@ -4122,9 +4122,9 @@
           <p:nvPr/>
         </p:nvCxnSpPr>
         <p:spPr>
-          <a:xfrm rot="5400000">
-            <a:off x="2792111" y="2894316"/>
-            <a:ext cx="531916" cy="289825"/>
+          <a:xfrm rot="16200000" flipH="1">
+            <a:off x="2639823" y="3031853"/>
+            <a:ext cx="531916" cy="14750"/>
           </a:xfrm>
           <a:prstGeom prst="curvedConnector3">
             <a:avLst>
@@ -4244,8 +4244,8 @@
         </p:nvCxnSpPr>
         <p:spPr>
           <a:xfrm rot="5400000">
-            <a:off x="1814439" y="2863875"/>
-            <a:ext cx="535872" cy="354662"/>
+            <a:off x="1662152" y="3016163"/>
+            <a:ext cx="535872" cy="50087"/>
           </a:xfrm>
           <a:prstGeom prst="curvedConnector3">
             <a:avLst>
@@ -4396,7 +4396,7 @@
         </p:nvSpPr>
         <p:spPr>
           <a:xfrm>
-            <a:off x="3361901" y="1052736"/>
+            <a:off x="3171779" y="1052736"/>
             <a:ext cx="382886" cy="360040"/>
           </a:xfrm>
           <a:prstGeom prst="rect">
@@ -4479,8 +4479,8 @@
         </p:nvCxnSpPr>
         <p:spPr>
           <a:xfrm rot="5400000">
-            <a:off x="3679228" y="713164"/>
-            <a:ext cx="213688" cy="465456"/>
+            <a:off x="3584167" y="618103"/>
+            <a:ext cx="213688" cy="655578"/>
           </a:xfrm>
           <a:prstGeom prst="curvedConnector3">
             <a:avLst>
@@ -4511,7 +4511,7 @@
         </p:nvSpPr>
         <p:spPr>
           <a:xfrm>
-            <a:off x="4305176" y="1052736"/>
+            <a:off x="4832309" y="1052736"/>
             <a:ext cx="382886" cy="360040"/>
           </a:xfrm>
           <a:prstGeom prst="rect">
@@ -4594,7 +4594,7 @@
         </p:nvCxnSpPr>
         <p:spPr>
           <a:xfrm rot="16200000" flipH="1">
-            <a:off x="4568733" y="1340662"/>
+            <a:off x="5095866" y="1340662"/>
             <a:ext cx="397424" cy="541652"/>
           </a:xfrm>
           <a:prstGeom prst="curvedConnector3">
@@ -4626,7 +4626,7 @@
         </p:nvSpPr>
         <p:spPr>
           <a:xfrm>
-            <a:off x="2068263" y="2413230"/>
+            <a:off x="1763688" y="2413230"/>
             <a:ext cx="382886" cy="360040"/>
           </a:xfrm>
           <a:prstGeom prst="rect">
@@ -4706,7 +4706,7 @@
         </p:nvSpPr>
         <p:spPr>
           <a:xfrm>
-            <a:off x="3011538" y="2413230"/>
+            <a:off x="2706963" y="2413230"/>
             <a:ext cx="382886" cy="360040"/>
           </a:xfrm>
           <a:prstGeom prst="rect">
@@ -4789,8 +4789,8 @@
         </p:nvCxnSpPr>
         <p:spPr>
           <a:xfrm rot="5400000">
-            <a:off x="2411408" y="1839474"/>
-            <a:ext cx="422054" cy="725458"/>
+            <a:off x="2011772" y="1934535"/>
+            <a:ext cx="422054" cy="535336"/>
           </a:xfrm>
           <a:prstGeom prst="curvedConnector3">
             <a:avLst>
@@ -4824,8 +4824,8 @@
         </p:nvCxnSpPr>
         <p:spPr>
           <a:xfrm rot="16200000" flipH="1">
-            <a:off x="2883045" y="2093294"/>
-            <a:ext cx="422054" cy="217817"/>
+            <a:off x="2483409" y="1998233"/>
+            <a:ext cx="422054" cy="407939"/>
           </a:xfrm>
           <a:prstGeom prst="curvedConnector3">
             <a:avLst>
@@ -5214,8 +5214,8 @@
         </p:nvCxnSpPr>
         <p:spPr>
           <a:xfrm rot="5400000">
-            <a:off x="4755177" y="2130136"/>
-            <a:ext cx="412530" cy="153658"/>
+            <a:off x="5018744" y="1866570"/>
+            <a:ext cx="412530" cy="680791"/>
           </a:xfrm>
           <a:prstGeom prst="curvedConnector3">
             <a:avLst>
@@ -5249,8 +5249,8 @@
         </p:nvCxnSpPr>
         <p:spPr>
           <a:xfrm rot="16200000" flipH="1">
-            <a:off x="5126640" y="1912331"/>
-            <a:ext cx="412530" cy="589268"/>
+            <a:off x="5390206" y="2175897"/>
+            <a:ext cx="412530" cy="62135"/>
           </a:xfrm>
           <a:prstGeom prst="curvedConnector3">
             <a:avLst>
@@ -5284,8 +5284,8 @@
         </p:nvCxnSpPr>
         <p:spPr>
           <a:xfrm rot="16200000" flipH="1">
-            <a:off x="5450676" y="1588295"/>
-            <a:ext cx="412530" cy="1237340"/>
+            <a:off x="5714242" y="1851861"/>
+            <a:ext cx="412530" cy="710207"/>
           </a:xfrm>
           <a:prstGeom prst="curvedConnector3">
             <a:avLst>

</xml_diff>